<commit_message>
Finishing touch to ppt decks
</commit_message>
<xml_diff>
--- a/presentations/2.convolution networks.pptx
+++ b/presentations/2.convolution networks.pptx
@@ -2523,7 +2523,7 @@
           <a:p>
             <a:fld id="{2565CF4C-F181-F64A-A583-FC42E35398CA}" type="datetimeFigureOut">
               <a:rPr lang="en-US" smtClean="0"/>
-              <a:t>10/4/19</a:t>
+              <a:t>10/8/19</a:t>
             </a:fld>
             <a:endParaRPr lang="en-US"/>
           </a:p>
@@ -3045,7 +3045,7 @@
           <a:p>
             <a:fld id="{76931AD4-DA52-48E2-8CE7-602C7D2886AD}" type="datetime8">
               <a:rPr lang="en-US" smtClean="0"/>
-              <a:t>10/4/19 5:44 PM</a:t>
+              <a:t>10/8/19 7:38 PM</a:t>
             </a:fld>
             <a:endParaRPr lang="en-US" dirty="0"/>
           </a:p>
@@ -3237,7 +3237,7 @@
           <a:p>
             <a:fld id="{76931AD4-DA52-48E2-8CE7-602C7D2886AD}" type="datetime8">
               <a:rPr lang="en-US" smtClean="0"/>
-              <a:t>10/4/19 5:44 PM</a:t>
+              <a:t>10/8/19 7:38 PM</a:t>
             </a:fld>
             <a:endParaRPr lang="en-US" dirty="0"/>
           </a:p>
@@ -3429,7 +3429,7 @@
           <a:p>
             <a:fld id="{76931AD4-DA52-48E2-8CE7-602C7D2886AD}" type="datetime8">
               <a:rPr lang="en-US" smtClean="0"/>
-              <a:t>10/4/19 5:44 PM</a:t>
+              <a:t>10/8/19 7:38 PM</a:t>
             </a:fld>
             <a:endParaRPr lang="en-US" dirty="0"/>
           </a:p>
@@ -3621,7 +3621,7 @@
           <a:p>
             <a:fld id="{76931AD4-DA52-48E2-8CE7-602C7D2886AD}" type="datetime8">
               <a:rPr lang="en-US" smtClean="0"/>
-              <a:t>10/4/19 5:44 PM</a:t>
+              <a:t>10/8/19 7:38 PM</a:t>
             </a:fld>
             <a:endParaRPr lang="en-US" dirty="0"/>
           </a:p>
@@ -4063,7 +4063,7 @@
           <a:p>
             <a:fld id="{76931AD4-DA52-48E2-8CE7-602C7D2886AD}" type="datetime8">
               <a:rPr lang="en-US" smtClean="0"/>
-              <a:t>10/4/19 5:44 PM</a:t>
+              <a:t>10/8/19 7:38 PM</a:t>
             </a:fld>
             <a:endParaRPr lang="en-US" dirty="0"/>
           </a:p>
@@ -4255,7 +4255,7 @@
           <a:p>
             <a:fld id="{76931AD4-DA52-48E2-8CE7-602C7D2886AD}" type="datetime8">
               <a:rPr lang="en-US" smtClean="0"/>
-              <a:t>10/4/19 5:44 PM</a:t>
+              <a:t>10/8/19 7:38 PM</a:t>
             </a:fld>
             <a:endParaRPr lang="en-US" dirty="0"/>
           </a:p>
@@ -4447,7 +4447,7 @@
           <a:p>
             <a:fld id="{76931AD4-DA52-48E2-8CE7-602C7D2886AD}" type="datetime8">
               <a:rPr lang="en-US" smtClean="0"/>
-              <a:t>10/4/19 5:44 PM</a:t>
+              <a:t>10/8/19 7:38 PM</a:t>
             </a:fld>
             <a:endParaRPr lang="en-US" dirty="0"/>
           </a:p>
@@ -4639,7 +4639,7 @@
           <a:p>
             <a:fld id="{76931AD4-DA52-48E2-8CE7-602C7D2886AD}" type="datetime8">
               <a:rPr lang="en-US" smtClean="0"/>
-              <a:t>10/4/19 5:44 PM</a:t>
+              <a:t>10/8/19 7:38 PM</a:t>
             </a:fld>
             <a:endParaRPr lang="en-US" dirty="0"/>
           </a:p>
@@ -4831,7 +4831,7 @@
           <a:p>
             <a:fld id="{76931AD4-DA52-48E2-8CE7-602C7D2886AD}" type="datetime8">
               <a:rPr lang="en-US" smtClean="0"/>
-              <a:t>10/4/19 5:44 PM</a:t>
+              <a:t>10/8/19 7:38 PM</a:t>
             </a:fld>
             <a:endParaRPr lang="en-US" dirty="0"/>
           </a:p>
@@ -5023,7 +5023,7 @@
           <a:p>
             <a:fld id="{76931AD4-DA52-48E2-8CE7-602C7D2886AD}" type="datetime8">
               <a:rPr lang="en-US" smtClean="0"/>
-              <a:t>10/4/19 5:44 PM</a:t>
+              <a:t>10/8/19 7:38 PM</a:t>
             </a:fld>
             <a:endParaRPr lang="en-US" dirty="0"/>
           </a:p>
@@ -5425,7 +5425,7 @@
           <a:p>
             <a:fld id="{385FA267-A831-FE40-81B2-7A84A4469274}" type="datetimeFigureOut">
               <a:rPr lang="en-US" smtClean="0"/>
-              <a:t>10/4/19</a:t>
+              <a:t>10/8/19</a:t>
             </a:fld>
             <a:endParaRPr lang="en-US"/>
           </a:p>
@@ -5623,7 +5623,7 @@
           <a:p>
             <a:fld id="{385FA267-A831-FE40-81B2-7A84A4469274}" type="datetimeFigureOut">
               <a:rPr lang="en-US" smtClean="0"/>
-              <a:t>10/4/19</a:t>
+              <a:t>10/8/19</a:t>
             </a:fld>
             <a:endParaRPr lang="en-US"/>
           </a:p>
@@ -5831,7 +5831,7 @@
           <a:p>
             <a:fld id="{385FA267-A831-FE40-81B2-7A84A4469274}" type="datetimeFigureOut">
               <a:rPr lang="en-US" smtClean="0"/>
-              <a:t>10/4/19</a:t>
+              <a:t>10/8/19</a:t>
             </a:fld>
             <a:endParaRPr lang="en-US"/>
           </a:p>
@@ -6279,7 +6279,7 @@
           <a:p>
             <a:fld id="{DCF04831-FE79-4C48-8B5F-6128F6AE010B}" type="datetimeFigureOut">
               <a:rPr lang="en-US" smtClean="0"/>
-              <a:t>10/4/19</a:t>
+              <a:t>10/8/19</a:t>
             </a:fld>
             <a:endParaRPr lang="en-US"/>
           </a:p>
@@ -6477,7 +6477,7 @@
           <a:p>
             <a:fld id="{DCF04831-FE79-4C48-8B5F-6128F6AE010B}" type="datetimeFigureOut">
               <a:rPr lang="en-US" smtClean="0"/>
-              <a:t>10/4/19</a:t>
+              <a:t>10/8/19</a:t>
             </a:fld>
             <a:endParaRPr lang="en-US"/>
           </a:p>
@@ -6752,7 +6752,7 @@
           <a:p>
             <a:fld id="{DCF04831-FE79-4C48-8B5F-6128F6AE010B}" type="datetimeFigureOut">
               <a:rPr lang="en-US" smtClean="0"/>
-              <a:t>10/4/19</a:t>
+              <a:t>10/8/19</a:t>
             </a:fld>
             <a:endParaRPr lang="en-US"/>
           </a:p>
@@ -7017,7 +7017,7 @@
           <a:p>
             <a:fld id="{DCF04831-FE79-4C48-8B5F-6128F6AE010B}" type="datetimeFigureOut">
               <a:rPr lang="en-US" smtClean="0"/>
-              <a:t>10/4/19</a:t>
+              <a:t>10/8/19</a:t>
             </a:fld>
             <a:endParaRPr lang="en-US"/>
           </a:p>
@@ -7429,7 +7429,7 @@
           <a:p>
             <a:fld id="{DCF04831-FE79-4C48-8B5F-6128F6AE010B}" type="datetimeFigureOut">
               <a:rPr lang="en-US" smtClean="0"/>
-              <a:t>10/4/19</a:t>
+              <a:t>10/8/19</a:t>
             </a:fld>
             <a:endParaRPr lang="en-US"/>
           </a:p>
@@ -7570,7 +7570,7 @@
           <a:p>
             <a:fld id="{DCF04831-FE79-4C48-8B5F-6128F6AE010B}" type="datetimeFigureOut">
               <a:rPr lang="en-US" smtClean="0"/>
-              <a:t>10/4/19</a:t>
+              <a:t>10/8/19</a:t>
             </a:fld>
             <a:endParaRPr lang="en-US"/>
           </a:p>
@@ -7683,7 +7683,7 @@
           <a:p>
             <a:fld id="{DCF04831-FE79-4C48-8B5F-6128F6AE010B}" type="datetimeFigureOut">
               <a:rPr lang="en-US" smtClean="0"/>
-              <a:t>10/4/19</a:t>
+              <a:t>10/8/19</a:t>
             </a:fld>
             <a:endParaRPr lang="en-US"/>
           </a:p>
@@ -7881,7 +7881,7 @@
           <a:p>
             <a:fld id="{385FA267-A831-FE40-81B2-7A84A4469274}" type="datetimeFigureOut">
               <a:rPr lang="en-US" smtClean="0"/>
-              <a:t>10/4/19</a:t>
+              <a:t>10/8/19</a:t>
             </a:fld>
             <a:endParaRPr lang="en-US"/>
           </a:p>
@@ -8192,7 +8192,7 @@
           <a:p>
             <a:fld id="{DCF04831-FE79-4C48-8B5F-6128F6AE010B}" type="datetimeFigureOut">
               <a:rPr lang="en-US" smtClean="0"/>
-              <a:t>10/4/19</a:t>
+              <a:t>10/8/19</a:t>
             </a:fld>
             <a:endParaRPr lang="en-US"/>
           </a:p>
@@ -8480,7 +8480,7 @@
           <a:p>
             <a:fld id="{DCF04831-FE79-4C48-8B5F-6128F6AE010B}" type="datetimeFigureOut">
               <a:rPr lang="en-US" smtClean="0"/>
-              <a:t>10/4/19</a:t>
+              <a:t>10/8/19</a:t>
             </a:fld>
             <a:endParaRPr lang="en-US"/>
           </a:p>
@@ -8678,7 +8678,7 @@
           <a:p>
             <a:fld id="{DCF04831-FE79-4C48-8B5F-6128F6AE010B}" type="datetimeFigureOut">
               <a:rPr lang="en-US" smtClean="0"/>
-              <a:t>10/4/19</a:t>
+              <a:t>10/8/19</a:t>
             </a:fld>
             <a:endParaRPr lang="en-US"/>
           </a:p>
@@ -8886,7 +8886,7 @@
           <a:p>
             <a:fld id="{DCF04831-FE79-4C48-8B5F-6128F6AE010B}" type="datetimeFigureOut">
               <a:rPr lang="en-US" smtClean="0"/>
-              <a:t>10/4/19</a:t>
+              <a:t>10/8/19</a:t>
             </a:fld>
             <a:endParaRPr lang="en-US"/>
           </a:p>
@@ -9520,7 +9520,7 @@
           <a:p>
             <a:fld id="{385FA267-A831-FE40-81B2-7A84A4469274}" type="datetimeFigureOut">
               <a:rPr lang="en-US" smtClean="0"/>
-              <a:t>10/4/19</a:t>
+              <a:t>10/8/19</a:t>
             </a:fld>
             <a:endParaRPr lang="en-US"/>
           </a:p>
@@ -9785,7 +9785,7 @@
           <a:p>
             <a:fld id="{385FA267-A831-FE40-81B2-7A84A4469274}" type="datetimeFigureOut">
               <a:rPr lang="en-US" smtClean="0"/>
-              <a:t>10/4/19</a:t>
+              <a:t>10/8/19</a:t>
             </a:fld>
             <a:endParaRPr lang="en-US"/>
           </a:p>
@@ -10197,7 +10197,7 @@
           <a:p>
             <a:fld id="{385FA267-A831-FE40-81B2-7A84A4469274}" type="datetimeFigureOut">
               <a:rPr lang="en-US" smtClean="0"/>
-              <a:t>10/4/19</a:t>
+              <a:t>10/8/19</a:t>
             </a:fld>
             <a:endParaRPr lang="en-US"/>
           </a:p>
@@ -10338,7 +10338,7 @@
           <a:p>
             <a:fld id="{385FA267-A831-FE40-81B2-7A84A4469274}" type="datetimeFigureOut">
               <a:rPr lang="en-US" smtClean="0"/>
-              <a:t>10/4/19</a:t>
+              <a:t>10/8/19</a:t>
             </a:fld>
             <a:endParaRPr lang="en-US"/>
           </a:p>
@@ -10451,7 +10451,7 @@
           <a:p>
             <a:fld id="{385FA267-A831-FE40-81B2-7A84A4469274}" type="datetimeFigureOut">
               <a:rPr lang="en-US" smtClean="0"/>
-              <a:t>10/4/19</a:t>
+              <a:t>10/8/19</a:t>
             </a:fld>
             <a:endParaRPr lang="en-US"/>
           </a:p>
@@ -10762,7 +10762,7 @@
           <a:p>
             <a:fld id="{385FA267-A831-FE40-81B2-7A84A4469274}" type="datetimeFigureOut">
               <a:rPr lang="en-US" smtClean="0"/>
-              <a:t>10/4/19</a:t>
+              <a:t>10/8/19</a:t>
             </a:fld>
             <a:endParaRPr lang="en-US"/>
           </a:p>
@@ -11050,7 +11050,7 @@
           <a:p>
             <a:fld id="{385FA267-A831-FE40-81B2-7A84A4469274}" type="datetimeFigureOut">
               <a:rPr lang="en-US" smtClean="0"/>
-              <a:t>10/4/19</a:t>
+              <a:t>10/8/19</a:t>
             </a:fld>
             <a:endParaRPr lang="en-US"/>
           </a:p>
@@ -11291,7 +11291,7 @@
           <a:p>
             <a:fld id="{385FA267-A831-FE40-81B2-7A84A4469274}" type="datetimeFigureOut">
               <a:rPr lang="en-US" smtClean="0"/>
-              <a:t>10/4/19</a:t>
+              <a:t>10/8/19</a:t>
             </a:fld>
             <a:endParaRPr lang="en-US"/>
           </a:p>
@@ -11860,7 +11860,7 @@
           <a:p>
             <a:fld id="{DCF04831-FE79-4C48-8B5F-6128F6AE010B}" type="datetimeFigureOut">
               <a:rPr lang="en-US" smtClean="0"/>
-              <a:t>10/4/19</a:t>
+              <a:t>10/8/19</a:t>
             </a:fld>
             <a:endParaRPr lang="en-US"/>
           </a:p>
@@ -12672,8 +12672,8 @@
           </a:p>
         </p:txBody>
       </p:sp>
-      <mc:AlternateContent xmlns:mc="http://schemas.openxmlformats.org/markup-compatibility/2006" xmlns:a14="http://schemas.microsoft.com/office/drawing/2010/main">
-        <mc:Choice Requires="a14">
+      <mc:AlternateContent xmlns:mc="http://schemas.openxmlformats.org/markup-compatibility/2006">
+        <mc:Choice xmlns:a14="http://schemas.microsoft.com/office/drawing/2010/main" Requires="a14">
           <p:sp>
             <p:nvSpPr>
               <p:cNvPr id="8" name="Text Placeholder 22"/>
@@ -12909,7 +12909,7 @@
                     </a:solidFill>
                     <a:latin typeface="+mj-lt"/>
                   </a:rPr>
-                  <a:t>Takes each feature map output from the convolutional layer and prepares a condensed feature map</a:t>
+                  <a:t>Take each feature map output from the convolutional layer and prepares a condensed feature map</a:t>
                 </a:r>
               </a:p>
               <a:p>
@@ -13000,7 +13000,7 @@
             </p:txBody>
           </p:sp>
         </mc:Choice>
-        <mc:Fallback xmlns="">
+        <mc:Fallback>
           <p:sp>
             <p:nvSpPr>
               <p:cNvPr id="8" name="Text Placeholder 22"/>
@@ -21940,7 +21940,7 @@
                 </a:solidFill>
                 <a:latin typeface="+mj-lt"/>
               </a:rPr>
-              <a:t>Grey scale image contains a single sample (intensity value) for each pixel</a:t>
+              <a:t>Gray-scale image contains a single sample (intensity value) for each pixel</a:t>
             </a:r>
           </a:p>
           <a:p>
@@ -21970,7 +21970,7 @@
                 </a:solidFill>
                 <a:latin typeface="+mj-lt"/>
               </a:rPr>
-              <a:t>Given an array of numbers, produce probabilities of the image being a certain class</a:t>
+              <a:t>Given an array of numbers, compute probabilities of the image belonging to a class</a:t>
             </a:r>
           </a:p>
         </p:txBody>

</xml_diff>